<commit_message>
Add current WIP code.
</commit_message>
<xml_diff>
--- a/Docs/Pitch/Pitch.pptx
+++ b/Docs/Pitch/Pitch.pptx
@@ -617,15 +617,7 @@
           <a:p>
             <a:r>
               <a:rPr lang="en-GB" dirty="0"/>
-              <a:t>What is project zombie and what is our answer to the brief. Our answer quite simply is a zombie survival game where we have replaced the traditional shooting </a:t>
-            </a:r>
-            <a:r>
-              <a:rPr lang="en-GB"/>
-              <a:t>mechanics with </a:t>
-            </a:r>
-            <a:r>
-              <a:rPr lang="en-GB" dirty="0"/>
-              <a:t>puzzle distraction mechanics.  </a:t>
+              <a:t>What is project zombie and what is our answer to the brief. Our answer to the brief is a zombie survival game where we have replaced the traditional shooting mechanics with puzzle distraction mechanics.  We use noise making objects to distract zombies, you can even use these objects to lure them into traps. </a:t>
             </a:r>
           </a:p>
         </p:txBody>
@@ -715,6 +707,18 @@
               <a:t>Michael</a:t>
             </a:r>
           </a:p>
+          <a:p>
+            <a:r>
+              <a:rPr lang="en-GB" dirty="0"/>
+              <a:t>If video does not play use this link. </a:t>
+            </a:r>
+          </a:p>
+          <a:p>
+            <a:r>
+              <a:rPr lang="en-GB" dirty="0"/>
+              <a:t>https://www.youtube.com/watch?v=bJrFpjK7Ud0</a:t>
+            </a:r>
+          </a:p>
         </p:txBody>
       </p:sp>
       <p:sp>
@@ -802,6 +806,12 @@
               <a:t>Jack</a:t>
             </a:r>
           </a:p>
+          <a:p>
+            <a:r>
+              <a:rPr lang="en-GB" dirty="0"/>
+              <a:t>We want to create a fun experience for our player, that involves not only creating feelings of excitement, but also frustration. </a:t>
+            </a:r>
+          </a:p>
         </p:txBody>
       </p:sp>
       <p:sp>
@@ -889,6 +899,12 @@
               <a:t>Bogdan </a:t>
             </a:r>
           </a:p>
+          <a:p>
+            <a:r>
+              <a:rPr lang="en-GB" dirty="0"/>
+              <a:t>We’ve had some player feedback. People liked the concept (potential). Crosshair. More features ( preview of throw, crouch, more types of zombies, upgrade system, item drops).</a:t>
+            </a:r>
+          </a:p>
         </p:txBody>
       </p:sp>
       <p:sp>
@@ -973,7 +989,13 @@
           <a:p>
             <a:r>
               <a:rPr lang="en-GB" dirty="0"/>
-              <a:t>Bogdan </a:t>
+              <a:t>Bogdan</a:t>
+            </a:r>
+          </a:p>
+          <a:p>
+            <a:r>
+              <a:rPr lang="en-GB" dirty="0"/>
+              <a:t>Development hasn't been smooth, these are some of the problems we’ve had making this game. </a:t>
             </a:r>
           </a:p>
         </p:txBody>
@@ -1060,7 +1082,13 @@
           <a:p>
             <a:r>
               <a:rPr lang="en-GB" dirty="0"/>
-              <a:t>Everyone </a:t>
+              <a:t>Michael and Jack </a:t>
+            </a:r>
+          </a:p>
+          <a:p>
+            <a:r>
+              <a:rPr lang="en-GB" dirty="0"/>
+              <a:t>This is a list of what we would like in our game some of these can be achieved with the skill set we have others will take a lot of time to develop. </a:t>
             </a:r>
           </a:p>
         </p:txBody>
@@ -1148,6 +1176,12 @@
             <a:r>
               <a:rPr lang="en-GB" dirty="0"/>
               <a:t>Everyone </a:t>
+            </a:r>
+          </a:p>
+          <a:p>
+            <a:r>
+              <a:rPr lang="en-GB" dirty="0"/>
+              <a:t>Are there any questions </a:t>
             </a:r>
           </a:p>
         </p:txBody>
@@ -7223,8 +7257,8 @@
         </p:nvSpPr>
         <p:spPr>
           <a:xfrm>
-            <a:off x="810001" y="447188"/>
-            <a:ext cx="3413084" cy="1559412"/>
+            <a:off x="643464" y="8814"/>
+            <a:ext cx="3413084" cy="1410556"/>
           </a:xfrm>
         </p:spPr>
         <p:txBody>
@@ -7258,8 +7292,8 @@
         </p:nvSpPr>
         <p:spPr>
           <a:xfrm>
-            <a:off x="0" y="2413000"/>
-            <a:ext cx="4223085" cy="4445000"/>
+            <a:off x="127591" y="1428184"/>
+            <a:ext cx="4223085" cy="5250881"/>
           </a:xfrm>
         </p:spPr>
         <p:txBody>
@@ -7274,7 +7308,7 @@
               </a:lnSpc>
             </a:pPr>
             <a:r>
-              <a:rPr lang="en-GB" sz="1600" dirty="0"/>
+              <a:rPr lang="en-GB" dirty="0"/>
               <a:t>A first person zombie survival game where the traditional shooting mechanics have been replaced with distraction mechanics. </a:t>
             </a:r>
           </a:p>
@@ -7285,7 +7319,7 @@
               </a:lnSpc>
             </a:pPr>
             <a:r>
-              <a:rPr lang="en-GB" sz="1600" dirty="0"/>
+              <a:rPr lang="en-GB" dirty="0"/>
               <a:t>Traditional shooting mechanics are firing invisible projectiles, weapon reloading, recoil, ammo depletion, etc. </a:t>
             </a:r>
           </a:p>
@@ -7296,7 +7330,7 @@
               </a:lnSpc>
             </a:pPr>
             <a:r>
-              <a:rPr lang="en-GB" sz="1600" dirty="0"/>
+              <a:rPr lang="en-GB" dirty="0"/>
               <a:t>Distraction mechanics are utilised via noise generating actors from the game world. </a:t>
             </a:r>
           </a:p>
@@ -7307,7 +7341,7 @@
               </a:lnSpc>
             </a:pPr>
             <a:r>
-              <a:rPr lang="en-GB" sz="1600" dirty="0"/>
+              <a:rPr lang="en-GB" dirty="0"/>
               <a:t>The player can pickup these noise generating objects via a physics gun and launch them to create noise when they collide with actors in the world.</a:t>
             </a:r>
           </a:p>
@@ -7910,7 +7944,7 @@
         </p:nvSpPr>
         <p:spPr>
           <a:xfrm>
-            <a:off x="396257" y="128900"/>
+            <a:off x="396257" y="64450"/>
             <a:ext cx="11399485" cy="1221435"/>
           </a:xfrm>
         </p:spPr>
@@ -7930,11 +7964,11 @@
       </p:sp>
       <p:pic>
         <p:nvPicPr>
-          <p:cNvPr id="4" name="Online Media 3">
+          <p:cNvPr id="5" name="Online Media 4">
             <a:hlinkClick r:id="" action="ppaction://media"/>
             <a:extLst>
               <a:ext uri="{FF2B5EF4-FFF2-40B4-BE49-F238E27FC236}">
-                <a16:creationId xmlns:a16="http://schemas.microsoft.com/office/drawing/2014/main" id="{F4857FB9-0F63-4FE6-B057-48ED02157E9E}"/>
+                <a16:creationId xmlns:a16="http://schemas.microsoft.com/office/drawing/2014/main" id="{3F8EFBE1-8213-4C72-8280-860026AEC437}"/>
               </a:ext>
             </a:extLst>
           </p:cNvPr>
@@ -7953,8 +7987,8 @@
         </p:blipFill>
         <p:spPr>
           <a:xfrm>
-            <a:off x="939528" y="1350335"/>
-            <a:ext cx="10312942" cy="5203825"/>
+            <a:off x="1314874" y="1201479"/>
+            <a:ext cx="9772503" cy="5497033"/>
           </a:xfrm>
           <a:prstGeom prst="rect">
             <a:avLst/>
@@ -9428,7 +9462,7 @@
         </p:spPr>
         <p:txBody>
           <a:bodyPr>
-            <a:normAutofit lnSpcReduction="10000"/>
+            <a:normAutofit fontScale="92500" lnSpcReduction="10000"/>
           </a:bodyPr>
           <a:lstStyle/>
           <a:p>
@@ -9503,7 +9537,13 @@
           <a:p>
             <a:r>
               <a:rPr lang="en-GB" dirty="0"/>
-              <a:t>Crafting/Building Mechanic</a:t>
+              <a:t>Crafting Mechanics </a:t>
+            </a:r>
+          </a:p>
+          <a:p>
+            <a:r>
+              <a:rPr lang="en-GB" dirty="0"/>
+              <a:t>Building Mechanics</a:t>
             </a:r>
           </a:p>
           <a:p>

</xml_diff>